<commit_message>
Updated sample test data and LocationActivityDiagram
</commit_message>
<xml_diff>
--- a/docs/diagrams/LocationActivityDiagram.pptx
+++ b/docs/diagrams/LocationActivityDiagram.pptx
@@ -3365,7 +3365,7 @@
         </p:nvSpPr>
         <p:spPr>
           <a:xfrm>
-            <a:off x="3809163" y="-790611"/>
+            <a:off x="6189506" y="-805126"/>
             <a:ext cx="235669" cy="235669"/>
           </a:xfrm>
           <a:prstGeom prst="ellipse">
@@ -3417,7 +3417,7 @@
         </p:nvCxnSpPr>
         <p:spPr>
           <a:xfrm>
-            <a:off x="4044835" y="-672776"/>
+            <a:off x="6425178" y="-687291"/>
             <a:ext cx="933253" cy="0"/>
           </a:xfrm>
           <a:prstGeom prst="straightConnector1">
@@ -3456,7 +3456,7 @@
         </p:nvSpPr>
         <p:spPr>
           <a:xfrm>
-            <a:off x="4978087" y="-1030995"/>
+            <a:off x="7358430" y="-1045510"/>
             <a:ext cx="2187019" cy="716437"/>
           </a:xfrm>
           <a:prstGeom prst="roundRect">
@@ -3520,7 +3520,7 @@
         </p:nvCxnSpPr>
         <p:spPr>
           <a:xfrm flipH="1">
-            <a:off x="6071597" y="-314557"/>
+            <a:off x="8451940" y="-329072"/>
             <a:ext cx="2" cy="617456"/>
           </a:xfrm>
           <a:prstGeom prst="straightConnector1">
@@ -3559,7 +3559,7 @@
         </p:nvSpPr>
         <p:spPr>
           <a:xfrm>
-            <a:off x="5831214" y="302899"/>
+            <a:off x="8211557" y="288384"/>
             <a:ext cx="480766" cy="480766"/>
           </a:xfrm>
           <a:prstGeom prst="diamond">
@@ -3609,9 +3609,9 @@
           <p:nvPr/>
         </p:nvCxnSpPr>
         <p:spPr>
-          <a:xfrm flipH="1">
-            <a:off x="4591423" y="543281"/>
-            <a:ext cx="2" cy="1003956"/>
+          <a:xfrm>
+            <a:off x="6971768" y="528766"/>
+            <a:ext cx="0" cy="484138"/>
           </a:xfrm>
           <a:prstGeom prst="straightConnector1">
             <a:avLst/>
@@ -3651,7 +3651,7 @@
         </p:nvCxnSpPr>
         <p:spPr>
           <a:xfrm flipV="1">
-            <a:off x="4581755" y="543282"/>
+            <a:off x="6962098" y="528767"/>
             <a:ext cx="1249459" cy="1"/>
           </a:xfrm>
           <a:prstGeom prst="line">
@@ -3687,7 +3687,7 @@
         </p:nvSpPr>
         <p:spPr>
           <a:xfrm>
-            <a:off x="3130952" y="118232"/>
+            <a:off x="5511295" y="103717"/>
             <a:ext cx="2820453" cy="369460"/>
           </a:xfrm>
           <a:prstGeom prst="rect">
@@ -3723,7 +3723,7 @@
         </p:nvSpPr>
         <p:spPr>
           <a:xfrm>
-            <a:off x="6311979" y="118233"/>
+            <a:off x="8692322" y="103718"/>
             <a:ext cx="853127" cy="369460"/>
           </a:xfrm>
           <a:prstGeom prst="rect">
@@ -3758,7 +3758,7 @@
         </p:nvSpPr>
         <p:spPr>
           <a:xfrm>
-            <a:off x="3464873" y="1549301"/>
+            <a:off x="5878258" y="1030503"/>
             <a:ext cx="2187019" cy="527900"/>
           </a:xfrm>
           <a:prstGeom prst="roundRect">
@@ -3811,7 +3811,7 @@
         </p:nvSpPr>
         <p:spPr>
           <a:xfrm>
-            <a:off x="5896238" y="6272713"/>
+            <a:off x="7295294" y="8738608"/>
             <a:ext cx="480766" cy="480766"/>
           </a:xfrm>
           <a:prstGeom prst="diamond">
@@ -3820,13 +3820,13 @@
         </p:spPr>
         <p:style>
           <a:lnRef idx="1">
-            <a:schemeClr val="accent2"/>
+            <a:schemeClr val="accent4"/>
           </a:lnRef>
           <a:fillRef idx="2">
-            <a:schemeClr val="accent2"/>
+            <a:schemeClr val="accent4"/>
           </a:fillRef>
           <a:effectRef idx="1">
-            <a:schemeClr val="accent2"/>
+            <a:schemeClr val="accent4"/>
           </a:effectRef>
           <a:fontRef idx="minor">
             <a:schemeClr val="dk1"/>
@@ -3862,7 +3862,7 @@
         </p:nvCxnSpPr>
         <p:spPr>
           <a:xfrm>
-            <a:off x="4798764" y="2590858"/>
+            <a:off x="7212149" y="2060641"/>
             <a:ext cx="853128" cy="0"/>
           </a:xfrm>
           <a:prstGeom prst="line">
@@ -3884,47 +3884,6 @@
           </a:fontRef>
         </p:style>
       </p:cxnSp>
-      <p:cxnSp>
-        <p:nvCxnSpPr>
-          <p:cNvPr id="50" name="Straight Arrow Connector 49">
-            <a:extLst>
-              <a:ext uri="{FF2B5EF4-FFF2-40B4-BE49-F238E27FC236}">
-                <a16:creationId xmlns:a16="http://schemas.microsoft.com/office/drawing/2014/main" xmlns="" id="{93890486-74D2-45FF-A307-364928250438}"/>
-              </a:ext>
-            </a:extLst>
-          </p:cNvPr>
-          <p:cNvCxnSpPr>
-            <a:cxnSpLocks/>
-          </p:cNvCxnSpPr>
-          <p:nvPr/>
-        </p:nvCxnSpPr>
-        <p:spPr>
-          <a:xfrm flipH="1">
-            <a:off x="3130953" y="3634986"/>
-            <a:ext cx="1" cy="375642"/>
-          </a:xfrm>
-          <a:prstGeom prst="straightConnector1">
-            <a:avLst/>
-          </a:prstGeom>
-          <a:ln>
-            <a:tailEnd type="triangle"/>
-          </a:ln>
-        </p:spPr>
-        <p:style>
-          <a:lnRef idx="1">
-            <a:schemeClr val="dk1"/>
-          </a:lnRef>
-          <a:fillRef idx="0">
-            <a:schemeClr val="dk1"/>
-          </a:fillRef>
-          <a:effectRef idx="0">
-            <a:schemeClr val="dk1"/>
-          </a:effectRef>
-          <a:fontRef idx="minor">
-            <a:schemeClr val="tx1"/>
-          </a:fontRef>
-        </p:style>
-      </p:cxnSp>
       <p:sp>
         <p:nvSpPr>
           <p:cNvPr id="51" name="Rectangle: Rounded Corners 50">
@@ -3939,7 +3898,7 @@
         </p:nvSpPr>
         <p:spPr>
           <a:xfrm>
-            <a:off x="1989396" y="2870521"/>
+            <a:off x="1542797" y="3778798"/>
             <a:ext cx="2216075" cy="764481"/>
           </a:xfrm>
           <a:prstGeom prst="roundRect">
@@ -3994,8 +3953,8 @@
         </p:nvCxnSpPr>
         <p:spPr>
           <a:xfrm>
-            <a:off x="6984421" y="2014708"/>
-            <a:ext cx="0" cy="4498388"/>
+            <a:off x="9364764" y="1519427"/>
+            <a:ext cx="0" cy="7447251"/>
           </a:xfrm>
           <a:prstGeom prst="line">
             <a:avLst/>
@@ -4032,8 +3991,8 @@
         </p:nvCxnSpPr>
         <p:spPr>
           <a:xfrm flipH="1">
-            <a:off x="6354768" y="6513096"/>
-            <a:ext cx="629653" cy="0"/>
+            <a:off x="7776060" y="8978991"/>
+            <a:ext cx="1588704" cy="0"/>
           </a:xfrm>
           <a:prstGeom prst="straightConnector1">
             <a:avLst/>
@@ -4071,7 +4030,7 @@
         </p:nvSpPr>
         <p:spPr>
           <a:xfrm>
-            <a:off x="4316179" y="2349931"/>
+            <a:off x="6731240" y="1820200"/>
             <a:ext cx="480766" cy="480766"/>
           </a:xfrm>
           <a:prstGeom prst="diamond">
@@ -4122,7 +4081,7 @@
         </p:nvCxnSpPr>
         <p:spPr>
           <a:xfrm>
-            <a:off x="3130952" y="4775092"/>
+            <a:off x="2628817" y="5727819"/>
             <a:ext cx="0" cy="530379"/>
           </a:xfrm>
           <a:prstGeom prst="line">
@@ -4155,13 +4114,14 @@
           </p:cNvPr>
           <p:cNvCxnSpPr>
             <a:cxnSpLocks/>
+            <a:endCxn id="64" idx="1"/>
           </p:cNvCxnSpPr>
           <p:nvPr/>
         </p:nvCxnSpPr>
         <p:spPr>
           <a:xfrm>
-            <a:off x="3130952" y="5305471"/>
-            <a:ext cx="1185227" cy="0"/>
+            <a:off x="2628817" y="6258198"/>
+            <a:ext cx="612045" cy="0"/>
           </a:xfrm>
           <a:prstGeom prst="straightConnector1">
             <a:avLst/>
@@ -4202,7 +4162,7 @@
         </p:nvCxnSpPr>
         <p:spPr>
           <a:xfrm>
-            <a:off x="6136621" y="6753479"/>
+            <a:off x="7535677" y="9219374"/>
             <a:ext cx="0" cy="747054"/>
           </a:xfrm>
           <a:prstGeom prst="straightConnector1">
@@ -4241,7 +4201,7 @@
         </p:nvGrpSpPr>
         <p:grpSpPr>
           <a:xfrm>
-            <a:off x="5996550" y="7502068"/>
+            <a:off x="7413414" y="9961505"/>
             <a:ext cx="235669" cy="235669"/>
             <a:chOff x="8040730" y="5082186"/>
             <a:chExt cx="235669" cy="235669"/>
@@ -4364,9 +4324,9 @@
           <p:nvPr/>
         </p:nvCxnSpPr>
         <p:spPr>
-          <a:xfrm flipH="1">
-            <a:off x="6984421" y="543281"/>
-            <a:ext cx="2" cy="1003956"/>
+          <a:xfrm>
+            <a:off x="9364766" y="528766"/>
+            <a:ext cx="0" cy="484138"/>
           </a:xfrm>
           <a:prstGeom prst="straightConnector1">
             <a:avLst/>
@@ -4404,7 +4364,7 @@
         </p:nvCxnSpPr>
         <p:spPr>
           <a:xfrm>
-            <a:off x="6311977" y="550865"/>
+            <a:off x="8692320" y="536350"/>
             <a:ext cx="672444" cy="2"/>
           </a:xfrm>
           <a:prstGeom prst="line">
@@ -4440,7 +4400,7 @@
         </p:nvSpPr>
         <p:spPr>
           <a:xfrm>
-            <a:off x="5991470" y="1557189"/>
+            <a:off x="8331748" y="1009227"/>
             <a:ext cx="2261279" cy="527900"/>
           </a:xfrm>
           <a:prstGeom prst="roundRect">
@@ -4489,7 +4449,7 @@
         </p:nvCxnSpPr>
         <p:spPr>
           <a:xfrm flipH="1">
-            <a:off x="4558381" y="2077201"/>
+            <a:off x="6971766" y="1558403"/>
             <a:ext cx="2" cy="260885"/>
           </a:xfrm>
           <a:prstGeom prst="straightConnector1">
@@ -4533,8 +4493,8 @@
         </p:nvCxnSpPr>
         <p:spPr>
           <a:xfrm>
-            <a:off x="3130952" y="2576967"/>
-            <a:ext cx="1187046" cy="0"/>
+            <a:off x="4369738" y="2055764"/>
+            <a:ext cx="2354506" cy="0"/>
           </a:xfrm>
           <a:prstGeom prst="line">
             <a:avLst/>
@@ -4569,7 +4529,7 @@
         </p:nvSpPr>
         <p:spPr>
           <a:xfrm>
-            <a:off x="1365813" y="2203591"/>
+            <a:off x="5049240" y="1710471"/>
             <a:ext cx="3016965" cy="369460"/>
           </a:xfrm>
           <a:prstGeom prst="rect">
@@ -4585,7 +4545,7 @@
           <a:p>
             <a:r>
               <a:rPr lang="en-SG" sz="1801" dirty="0" smtClean="0"/>
-              <a:t>[User at index has an address</a:t>
+              <a:t>[Index is valid</a:t>
             </a:r>
             <a:r>
               <a:rPr lang="en-SG" sz="1801" dirty="0" smtClean="0"/>
@@ -4609,7 +4569,7 @@
         </p:nvSpPr>
         <p:spPr>
           <a:xfrm>
-            <a:off x="4813206" y="2208584"/>
+            <a:off x="7211222" y="1710471"/>
             <a:ext cx="694431" cy="369460"/>
           </a:xfrm>
           <a:prstGeom prst="rect">
@@ -4643,7 +4603,7 @@
         </p:nvCxnSpPr>
         <p:spPr>
           <a:xfrm>
-            <a:off x="3135572" y="2584848"/>
+            <a:off x="4369738" y="2055764"/>
             <a:ext cx="0" cy="285674"/>
           </a:xfrm>
           <a:prstGeom prst="straightConnector1">
@@ -4685,7 +4645,7 @@
         </p:nvSpPr>
         <p:spPr>
           <a:xfrm>
-            <a:off x="4556562" y="2870505"/>
+            <a:off x="3949393" y="3781713"/>
             <a:ext cx="2216075" cy="764481"/>
           </a:xfrm>
           <a:prstGeom prst="roundRect">
@@ -4732,7 +4692,7 @@
         </p:nvCxnSpPr>
         <p:spPr>
           <a:xfrm>
-            <a:off x="5651892" y="2584848"/>
+            <a:off x="8065277" y="2055764"/>
             <a:ext cx="0" cy="285674"/>
           </a:xfrm>
           <a:prstGeom prst="straightConnector1">
@@ -4774,7 +4734,7 @@
         </p:nvSpPr>
         <p:spPr>
           <a:xfrm>
-            <a:off x="1989395" y="4010611"/>
+            <a:off x="1542797" y="4937457"/>
             <a:ext cx="2216075" cy="764481"/>
           </a:xfrm>
           <a:prstGeom prst="roundRect">
@@ -4831,7 +4791,7 @@
         </p:nvSpPr>
         <p:spPr>
           <a:xfrm>
-            <a:off x="4316179" y="5065088"/>
+            <a:off x="3240862" y="6017815"/>
             <a:ext cx="480766" cy="480766"/>
           </a:xfrm>
           <a:prstGeom prst="diamond">
@@ -4882,8 +4842,8 @@
         </p:nvCxnSpPr>
         <p:spPr>
           <a:xfrm>
-            <a:off x="5664599" y="3634986"/>
-            <a:ext cx="0" cy="1670485"/>
+            <a:off x="6516846" y="3623201"/>
+            <a:ext cx="0" cy="3530347"/>
           </a:xfrm>
           <a:prstGeom prst="line">
             <a:avLst/>
@@ -4914,8 +4874,8 @@
         </p:nvCxnSpPr>
         <p:spPr>
           <a:xfrm flipH="1">
-            <a:off x="4796945" y="5305471"/>
-            <a:ext cx="867654" cy="0"/>
+            <a:off x="3721628" y="6258198"/>
+            <a:ext cx="1327612" cy="0"/>
           </a:xfrm>
           <a:prstGeom prst="straightConnector1">
             <a:avLst/>
@@ -4952,8 +4912,8 @@
         </p:nvCxnSpPr>
         <p:spPr>
           <a:xfrm>
-            <a:off x="4556562" y="5545854"/>
-            <a:ext cx="0" cy="967242"/>
+            <a:off x="3481245" y="6498581"/>
+            <a:ext cx="0" cy="659229"/>
           </a:xfrm>
           <a:prstGeom prst="line">
             <a:avLst/>
@@ -4982,14 +4942,12 @@
       <p:cxnSp>
         <p:nvCxnSpPr>
           <p:cNvPr id="77" name="Straight Arrow Connector 76"/>
-          <p:cNvCxnSpPr>
-            <a:endCxn id="46" idx="1"/>
-          </p:cNvCxnSpPr>
+          <p:cNvCxnSpPr/>
           <p:nvPr/>
         </p:nvCxnSpPr>
         <p:spPr>
           <a:xfrm>
-            <a:off x="4556562" y="6513096"/>
+            <a:off x="5955618" y="8978991"/>
             <a:ext cx="1339676" cy="0"/>
           </a:xfrm>
           <a:prstGeom prst="straightConnector1">
@@ -5011,6 +4969,1135 @@
           </a:fillRef>
           <a:effectRef idx="0">
             <a:schemeClr val="accent1"/>
+          </a:effectRef>
+          <a:fontRef idx="minor">
+            <a:schemeClr val="tx1"/>
+          </a:fontRef>
+        </p:style>
+      </p:cxnSp>
+      <p:sp>
+        <p:nvSpPr>
+          <p:cNvPr id="84" name="Diamond 83">
+            <a:extLst>
+              <a:ext uri="{FF2B5EF4-FFF2-40B4-BE49-F238E27FC236}">
+                <a16:creationId xmlns:a16="http://schemas.microsoft.com/office/drawing/2014/main" xmlns="" id="{0ACD7DC4-F31E-42B2-9D34-41B1AE997EB1}"/>
+              </a:ext>
+            </a:extLst>
+          </p:cNvPr>
+          <p:cNvSpPr/>
+          <p:nvPr/>
+        </p:nvSpPr>
+        <p:spPr>
+          <a:xfrm>
+            <a:off x="4129355" y="2332671"/>
+            <a:ext cx="480766" cy="480766"/>
+          </a:xfrm>
+          <a:prstGeom prst="diamond">
+            <a:avLst/>
+          </a:prstGeom>
+        </p:spPr>
+        <p:style>
+          <a:lnRef idx="1">
+            <a:schemeClr val="accent6"/>
+          </a:lnRef>
+          <a:fillRef idx="2">
+            <a:schemeClr val="accent6"/>
+          </a:fillRef>
+          <a:effectRef idx="1">
+            <a:schemeClr val="accent6"/>
+          </a:effectRef>
+          <a:fontRef idx="minor">
+            <a:schemeClr val="dk1"/>
+          </a:fontRef>
+        </p:style>
+        <p:txBody>
+          <a:bodyPr rot="0" spcFirstLastPara="0" vertOverflow="overflow" horzOverflow="overflow" vert="horz" wrap="square" lIns="91440" tIns="45721" rIns="91440" bIns="45721" numCol="1" spcCol="0" rtlCol="0" fromWordArt="0" anchor="ctr" anchorCtr="0" forceAA="0" compatLnSpc="1">
+            <a:prstTxWarp prst="textNoShape">
+              <a:avLst/>
+            </a:prstTxWarp>
+            <a:noAutofit/>
+          </a:bodyPr>
+          <a:lstStyle/>
+          <a:p>
+            <a:pPr algn="ctr"/>
+            <a:endParaRPr lang="en-SG" sz="1801"/>
+          </a:p>
+        </p:txBody>
+      </p:sp>
+      <p:cxnSp>
+        <p:nvCxnSpPr>
+          <p:cNvPr id="86" name="Straight Connector 85">
+            <a:extLst>
+              <a:ext uri="{FF2B5EF4-FFF2-40B4-BE49-F238E27FC236}">
+                <a16:creationId xmlns:a16="http://schemas.microsoft.com/office/drawing/2014/main" xmlns="" id="{E9F9F46E-F315-4E20-BA19-DC5A481900A9}"/>
+              </a:ext>
+            </a:extLst>
+          </p:cNvPr>
+          <p:cNvCxnSpPr/>
+          <p:nvPr/>
+        </p:nvCxnSpPr>
+        <p:spPr>
+          <a:xfrm>
+            <a:off x="3485243" y="2573054"/>
+            <a:ext cx="644112" cy="1"/>
+          </a:xfrm>
+          <a:prstGeom prst="line">
+            <a:avLst/>
+          </a:prstGeom>
+        </p:spPr>
+        <p:style>
+          <a:lnRef idx="1">
+            <a:schemeClr val="dk1"/>
+          </a:lnRef>
+          <a:fillRef idx="0">
+            <a:schemeClr val="dk1"/>
+          </a:fillRef>
+          <a:effectRef idx="0">
+            <a:schemeClr val="dk1"/>
+          </a:effectRef>
+          <a:fontRef idx="minor">
+            <a:schemeClr val="tx1"/>
+          </a:fontRef>
+        </p:style>
+      </p:cxnSp>
+      <p:cxnSp>
+        <p:nvCxnSpPr>
+          <p:cNvPr id="88" name="Straight Arrow Connector 87">
+            <a:extLst>
+              <a:ext uri="{FF2B5EF4-FFF2-40B4-BE49-F238E27FC236}">
+                <a16:creationId xmlns:a16="http://schemas.microsoft.com/office/drawing/2014/main" xmlns="" id="{46F847A3-19CB-4D8A-BF61-CBF1573B6170}"/>
+              </a:ext>
+            </a:extLst>
+          </p:cNvPr>
+          <p:cNvCxnSpPr>
+            <a:cxnSpLocks/>
+          </p:cNvCxnSpPr>
+          <p:nvPr/>
+        </p:nvCxnSpPr>
+        <p:spPr>
+          <a:xfrm>
+            <a:off x="3485618" y="2563529"/>
+            <a:ext cx="0" cy="484138"/>
+          </a:xfrm>
+          <a:prstGeom prst="straightConnector1">
+            <a:avLst/>
+          </a:prstGeom>
+          <a:ln>
+            <a:tailEnd type="triangle"/>
+          </a:ln>
+        </p:spPr>
+        <p:style>
+          <a:lnRef idx="1">
+            <a:schemeClr val="dk1"/>
+          </a:lnRef>
+          <a:fillRef idx="0">
+            <a:schemeClr val="dk1"/>
+          </a:fillRef>
+          <a:effectRef idx="0">
+            <a:schemeClr val="dk1"/>
+          </a:effectRef>
+          <a:fontRef idx="minor">
+            <a:schemeClr val="tx1"/>
+          </a:fontRef>
+        </p:style>
+      </p:cxnSp>
+      <p:sp>
+        <p:nvSpPr>
+          <p:cNvPr id="90" name="TextBox 89">
+            <a:extLst>
+              <a:ext uri="{FF2B5EF4-FFF2-40B4-BE49-F238E27FC236}">
+                <a16:creationId xmlns:a16="http://schemas.microsoft.com/office/drawing/2014/main" xmlns="" id="{3ABD3846-DF71-49C4-AE22-6CE1C8B39149}"/>
+              </a:ext>
+            </a:extLst>
+          </p:cNvPr>
+          <p:cNvSpPr txBox="1"/>
+          <p:nvPr/>
+        </p:nvSpPr>
+        <p:spPr>
+          <a:xfrm>
+            <a:off x="2597793" y="1977672"/>
+            <a:ext cx="1381125" cy="646587"/>
+          </a:xfrm>
+          <a:prstGeom prst="rect">
+            <a:avLst/>
+          </a:prstGeom>
+          <a:noFill/>
+        </p:spPr>
+        <p:txBody>
+          <a:bodyPr wrap="square" rtlCol="0">
+            <a:spAutoFit/>
+          </a:bodyPr>
+          <a:lstStyle/>
+          <a:p>
+            <a:r>
+              <a:rPr lang="en-SG" sz="1801" dirty="0" smtClean="0"/>
+              <a:t>[Google is reachable</a:t>
+            </a:r>
+            <a:r>
+              <a:rPr lang="en-SG" sz="1801" dirty="0" smtClean="0"/>
+              <a:t>]</a:t>
+            </a:r>
+            <a:endParaRPr lang="en-SG" sz="1801" dirty="0"/>
+          </a:p>
+        </p:txBody>
+      </p:sp>
+      <p:cxnSp>
+        <p:nvCxnSpPr>
+          <p:cNvPr id="91" name="Straight Arrow Connector 90"/>
+          <p:cNvCxnSpPr/>
+          <p:nvPr/>
+        </p:nvCxnSpPr>
+        <p:spPr>
+          <a:xfrm>
+            <a:off x="5646599" y="2568292"/>
+            <a:ext cx="0" cy="285674"/>
+          </a:xfrm>
+          <a:prstGeom prst="straightConnector1">
+            <a:avLst/>
+          </a:prstGeom>
+          <a:ln>
+            <a:solidFill>
+              <a:schemeClr val="tx1"/>
+            </a:solidFill>
+            <a:tailEnd type="triangle"/>
+          </a:ln>
+        </p:spPr>
+        <p:style>
+          <a:lnRef idx="1">
+            <a:schemeClr val="accent1"/>
+          </a:lnRef>
+          <a:fillRef idx="0">
+            <a:schemeClr val="accent1"/>
+          </a:fillRef>
+          <a:effectRef idx="0">
+            <a:schemeClr val="accent1"/>
+          </a:effectRef>
+          <a:fontRef idx="minor">
+            <a:schemeClr val="tx1"/>
+          </a:fontRef>
+        </p:style>
+      </p:cxnSp>
+      <p:cxnSp>
+        <p:nvCxnSpPr>
+          <p:cNvPr id="92" name="Straight Connector 91">
+            <a:extLst>
+              <a:ext uri="{FF2B5EF4-FFF2-40B4-BE49-F238E27FC236}">
+                <a16:creationId xmlns:a16="http://schemas.microsoft.com/office/drawing/2014/main" xmlns="" id="{3AE9CE8A-80E1-4D09-9F84-E25B9A8DAF68}"/>
+              </a:ext>
+            </a:extLst>
+          </p:cNvPr>
+          <p:cNvCxnSpPr>
+            <a:cxnSpLocks/>
+          </p:cNvCxnSpPr>
+          <p:nvPr/>
+        </p:nvCxnSpPr>
+        <p:spPr>
+          <a:xfrm>
+            <a:off x="4610121" y="2573054"/>
+            <a:ext cx="1036478" cy="0"/>
+          </a:xfrm>
+          <a:prstGeom prst="line">
+            <a:avLst/>
+          </a:prstGeom>
+        </p:spPr>
+        <p:style>
+          <a:lnRef idx="1">
+            <a:schemeClr val="dk1"/>
+          </a:lnRef>
+          <a:fillRef idx="0">
+            <a:schemeClr val="dk1"/>
+          </a:fillRef>
+          <a:effectRef idx="0">
+            <a:schemeClr val="dk1"/>
+          </a:effectRef>
+          <a:fontRef idx="minor">
+            <a:schemeClr val="tx1"/>
+          </a:fontRef>
+        </p:style>
+      </p:cxnSp>
+      <p:sp>
+        <p:nvSpPr>
+          <p:cNvPr id="93" name="TextBox 92">
+            <a:extLst>
+              <a:ext uri="{FF2B5EF4-FFF2-40B4-BE49-F238E27FC236}">
+                <a16:creationId xmlns:a16="http://schemas.microsoft.com/office/drawing/2014/main" xmlns="" id="{3ABD3846-DF71-49C4-AE22-6CE1C8B39149}"/>
+              </a:ext>
+            </a:extLst>
+          </p:cNvPr>
+          <p:cNvSpPr txBox="1"/>
+          <p:nvPr/>
+        </p:nvSpPr>
+        <p:spPr>
+          <a:xfrm>
+            <a:off x="4873773" y="2203594"/>
+            <a:ext cx="694431" cy="369460"/>
+          </a:xfrm>
+          <a:prstGeom prst="rect">
+            <a:avLst/>
+          </a:prstGeom>
+          <a:noFill/>
+        </p:spPr>
+        <p:txBody>
+          <a:bodyPr wrap="square" rtlCol="0">
+            <a:spAutoFit/>
+          </a:bodyPr>
+          <a:lstStyle/>
+          <a:p>
+            <a:r>
+              <a:rPr lang="en-SG" sz="1801" dirty="0" smtClean="0"/>
+              <a:t>[else</a:t>
+            </a:r>
+            <a:r>
+              <a:rPr lang="en-SG" sz="1801" dirty="0" smtClean="0"/>
+              <a:t>]</a:t>
+            </a:r>
+            <a:endParaRPr lang="en-SG" sz="1801" dirty="0"/>
+          </a:p>
+        </p:txBody>
+      </p:sp>
+      <p:sp>
+        <p:nvSpPr>
+          <p:cNvPr id="94" name="Diamond 93">
+            <a:extLst>
+              <a:ext uri="{FF2B5EF4-FFF2-40B4-BE49-F238E27FC236}">
+                <a16:creationId xmlns:a16="http://schemas.microsoft.com/office/drawing/2014/main" xmlns="" id="{0ACD7DC4-F31E-42B2-9D34-41B1AE997EB1}"/>
+              </a:ext>
+            </a:extLst>
+          </p:cNvPr>
+          <p:cNvSpPr/>
+          <p:nvPr/>
+        </p:nvSpPr>
+        <p:spPr>
+          <a:xfrm>
+            <a:off x="3244860" y="3057192"/>
+            <a:ext cx="480766" cy="480766"/>
+          </a:xfrm>
+          <a:prstGeom prst="diamond">
+            <a:avLst/>
+          </a:prstGeom>
+        </p:spPr>
+        <p:style>
+          <a:lnRef idx="1">
+            <a:schemeClr val="accent6"/>
+          </a:lnRef>
+          <a:fillRef idx="2">
+            <a:schemeClr val="accent6"/>
+          </a:fillRef>
+          <a:effectRef idx="1">
+            <a:schemeClr val="accent6"/>
+          </a:effectRef>
+          <a:fontRef idx="minor">
+            <a:schemeClr val="dk1"/>
+          </a:fontRef>
+        </p:style>
+        <p:txBody>
+          <a:bodyPr rot="0" spcFirstLastPara="0" vertOverflow="overflow" horzOverflow="overflow" vert="horz" wrap="square" lIns="91440" tIns="45721" rIns="91440" bIns="45721" numCol="1" spcCol="0" rtlCol="0" fromWordArt="0" anchor="ctr" anchorCtr="0" forceAA="0" compatLnSpc="1">
+            <a:prstTxWarp prst="textNoShape">
+              <a:avLst/>
+            </a:prstTxWarp>
+            <a:noAutofit/>
+          </a:bodyPr>
+          <a:lstStyle/>
+          <a:p>
+            <a:pPr algn="ctr"/>
+            <a:endParaRPr lang="en-SG" sz="1801"/>
+          </a:p>
+        </p:txBody>
+      </p:sp>
+      <p:cxnSp>
+        <p:nvCxnSpPr>
+          <p:cNvPr id="95" name="Straight Connector 94">
+            <a:extLst>
+              <a:ext uri="{FF2B5EF4-FFF2-40B4-BE49-F238E27FC236}">
+                <a16:creationId xmlns:a16="http://schemas.microsoft.com/office/drawing/2014/main" xmlns="" id="{E9F9F46E-F315-4E20-BA19-DC5A481900A9}"/>
+              </a:ext>
+            </a:extLst>
+          </p:cNvPr>
+          <p:cNvCxnSpPr/>
+          <p:nvPr/>
+        </p:nvCxnSpPr>
+        <p:spPr>
+          <a:xfrm>
+            <a:off x="2613016" y="3300705"/>
+            <a:ext cx="644112" cy="1"/>
+          </a:xfrm>
+          <a:prstGeom prst="line">
+            <a:avLst/>
+          </a:prstGeom>
+        </p:spPr>
+        <p:style>
+          <a:lnRef idx="1">
+            <a:schemeClr val="dk1"/>
+          </a:lnRef>
+          <a:fillRef idx="0">
+            <a:schemeClr val="dk1"/>
+          </a:fillRef>
+          <a:effectRef idx="0">
+            <a:schemeClr val="dk1"/>
+          </a:effectRef>
+          <a:fontRef idx="minor">
+            <a:schemeClr val="tx1"/>
+          </a:fontRef>
+        </p:style>
+      </p:cxnSp>
+      <p:cxnSp>
+        <p:nvCxnSpPr>
+          <p:cNvPr id="96" name="Straight Arrow Connector 95">
+            <a:extLst>
+              <a:ext uri="{FF2B5EF4-FFF2-40B4-BE49-F238E27FC236}">
+                <a16:creationId xmlns:a16="http://schemas.microsoft.com/office/drawing/2014/main" xmlns="" id="{46F847A3-19CB-4D8A-BF61-CBF1573B6170}"/>
+              </a:ext>
+            </a:extLst>
+          </p:cNvPr>
+          <p:cNvCxnSpPr>
+            <a:cxnSpLocks/>
+          </p:cNvCxnSpPr>
+          <p:nvPr/>
+        </p:nvCxnSpPr>
+        <p:spPr>
+          <a:xfrm>
+            <a:off x="2613391" y="3291180"/>
+            <a:ext cx="0" cy="484138"/>
+          </a:xfrm>
+          <a:prstGeom prst="straightConnector1">
+            <a:avLst/>
+          </a:prstGeom>
+          <a:ln>
+            <a:tailEnd type="triangle"/>
+          </a:ln>
+        </p:spPr>
+        <p:style>
+          <a:lnRef idx="1">
+            <a:schemeClr val="dk1"/>
+          </a:lnRef>
+          <a:fillRef idx="0">
+            <a:schemeClr val="dk1"/>
+          </a:fillRef>
+          <a:effectRef idx="0">
+            <a:schemeClr val="dk1"/>
+          </a:effectRef>
+          <a:fontRef idx="minor">
+            <a:schemeClr val="tx1"/>
+          </a:fontRef>
+        </p:style>
+      </p:cxnSp>
+      <p:sp>
+        <p:nvSpPr>
+          <p:cNvPr id="97" name="TextBox 96">
+            <a:extLst>
+              <a:ext uri="{FF2B5EF4-FFF2-40B4-BE49-F238E27FC236}">
+                <a16:creationId xmlns:a16="http://schemas.microsoft.com/office/drawing/2014/main" xmlns="" id="{3ABD3846-DF71-49C4-AE22-6CE1C8B39149}"/>
+              </a:ext>
+            </a:extLst>
+          </p:cNvPr>
+          <p:cNvSpPr txBox="1"/>
+          <p:nvPr/>
+        </p:nvSpPr>
+        <p:spPr>
+          <a:xfrm>
+            <a:off x="1377232" y="2650988"/>
+            <a:ext cx="1954775" cy="646587"/>
+          </a:xfrm>
+          <a:prstGeom prst="rect">
+            <a:avLst/>
+          </a:prstGeom>
+          <a:noFill/>
+        </p:spPr>
+        <p:txBody>
+          <a:bodyPr wrap="square" rtlCol="0">
+            <a:spAutoFit/>
+          </a:bodyPr>
+          <a:lstStyle/>
+          <a:p>
+            <a:r>
+              <a:rPr lang="en-SG" sz="1801" dirty="0" smtClean="0"/>
+              <a:t>[Person at index has an address</a:t>
+            </a:r>
+            <a:r>
+              <a:rPr lang="en-SG" sz="1801" dirty="0" smtClean="0"/>
+              <a:t>]</a:t>
+            </a:r>
+            <a:endParaRPr lang="en-SG" sz="1801" dirty="0"/>
+          </a:p>
+        </p:txBody>
+      </p:sp>
+      <p:sp>
+        <p:nvSpPr>
+          <p:cNvPr id="98" name="Rectangle: Rounded Corners 50">
+            <a:extLst>
+              <a:ext uri="{FF2B5EF4-FFF2-40B4-BE49-F238E27FC236}">
+                <a16:creationId xmlns:a16="http://schemas.microsoft.com/office/drawing/2014/main" xmlns="" id="{D62D81FC-C644-4602-90C8-B7974D14CA54}"/>
+              </a:ext>
+            </a:extLst>
+          </p:cNvPr>
+          <p:cNvSpPr/>
+          <p:nvPr/>
+        </p:nvSpPr>
+        <p:spPr>
+          <a:xfrm>
+            <a:off x="4625590" y="2858720"/>
+            <a:ext cx="2216075" cy="764481"/>
+          </a:xfrm>
+          <a:prstGeom prst="roundRect">
+            <a:avLst/>
+          </a:prstGeom>
+        </p:spPr>
+        <p:style>
+          <a:lnRef idx="1">
+            <a:schemeClr val="accent6"/>
+          </a:lnRef>
+          <a:fillRef idx="2">
+            <a:schemeClr val="accent6"/>
+          </a:fillRef>
+          <a:effectRef idx="1">
+            <a:schemeClr val="accent6"/>
+          </a:effectRef>
+          <a:fontRef idx="minor">
+            <a:schemeClr val="dk1"/>
+          </a:fontRef>
+        </p:style>
+        <p:txBody>
+          <a:bodyPr rot="0" spcFirstLastPara="0" vertOverflow="overflow" horzOverflow="overflow" vert="horz" wrap="square" lIns="91440" tIns="45721" rIns="91440" bIns="45721" numCol="1" spcCol="0" rtlCol="0" fromWordArt="0" anchor="ctr" anchorCtr="0" forceAA="0" compatLnSpc="1">
+            <a:prstTxWarp prst="textNoShape">
+              <a:avLst/>
+            </a:prstTxWarp>
+            <a:noAutofit/>
+          </a:bodyPr>
+          <a:lstStyle/>
+          <a:p>
+            <a:pPr algn="ctr"/>
+            <a:r>
+              <a:rPr lang="en-SG" sz="1801" dirty="0" smtClean="0"/>
+              <a:t>Display </a:t>
+            </a:r>
+            <a:r>
+              <a:rPr lang="en-SG" sz="1801" dirty="0" smtClean="0"/>
+              <a:t>connection </a:t>
+            </a:r>
+            <a:r>
+              <a:rPr lang="en-SG" sz="1801" dirty="0" smtClean="0"/>
+              <a:t>problems message </a:t>
+            </a:r>
+            <a:endParaRPr lang="en-SG" sz="1801" dirty="0"/>
+          </a:p>
+        </p:txBody>
+      </p:sp>
+      <p:sp>
+        <p:nvSpPr>
+          <p:cNvPr id="99" name="Rectangle: Rounded Corners 50">
+            <a:extLst>
+              <a:ext uri="{FF2B5EF4-FFF2-40B4-BE49-F238E27FC236}">
+                <a16:creationId xmlns:a16="http://schemas.microsoft.com/office/drawing/2014/main" xmlns="" id="{D62D81FC-C644-4602-90C8-B7974D14CA54}"/>
+              </a:ext>
+            </a:extLst>
+          </p:cNvPr>
+          <p:cNvSpPr/>
+          <p:nvPr/>
+        </p:nvSpPr>
+        <p:spPr>
+          <a:xfrm>
+            <a:off x="7036730" y="2334462"/>
+            <a:ext cx="2216075" cy="764481"/>
+          </a:xfrm>
+          <a:prstGeom prst="roundRect">
+            <a:avLst/>
+          </a:prstGeom>
+        </p:spPr>
+        <p:style>
+          <a:lnRef idx="1">
+            <a:schemeClr val="accent6"/>
+          </a:lnRef>
+          <a:fillRef idx="2">
+            <a:schemeClr val="accent6"/>
+          </a:fillRef>
+          <a:effectRef idx="1">
+            <a:schemeClr val="accent6"/>
+          </a:effectRef>
+          <a:fontRef idx="minor">
+            <a:schemeClr val="dk1"/>
+          </a:fontRef>
+        </p:style>
+        <p:txBody>
+          <a:bodyPr rot="0" spcFirstLastPara="0" vertOverflow="overflow" horzOverflow="overflow" vert="horz" wrap="square" lIns="91440" tIns="45721" rIns="91440" bIns="45721" numCol="1" spcCol="0" rtlCol="0" fromWordArt="0" anchor="ctr" anchorCtr="0" forceAA="0" compatLnSpc="1">
+            <a:prstTxWarp prst="textNoShape">
+              <a:avLst/>
+            </a:prstTxWarp>
+            <a:noAutofit/>
+          </a:bodyPr>
+          <a:lstStyle/>
+          <a:p>
+            <a:pPr algn="ctr"/>
+            <a:r>
+              <a:rPr lang="en-SG" sz="1801" dirty="0" smtClean="0"/>
+              <a:t>Display invalid index message </a:t>
+            </a:r>
+            <a:endParaRPr lang="en-SG" sz="1801" dirty="0"/>
+          </a:p>
+        </p:txBody>
+      </p:sp>
+      <p:cxnSp>
+        <p:nvCxnSpPr>
+          <p:cNvPr id="100" name="Straight Connector 99">
+            <a:extLst>
+              <a:ext uri="{FF2B5EF4-FFF2-40B4-BE49-F238E27FC236}">
+                <a16:creationId xmlns:a16="http://schemas.microsoft.com/office/drawing/2014/main" xmlns="" id="{1321E06C-BD3F-48BC-B492-E9A960F6A4C8}"/>
+              </a:ext>
+            </a:extLst>
+          </p:cNvPr>
+          <p:cNvCxnSpPr>
+            <a:cxnSpLocks/>
+          </p:cNvCxnSpPr>
+          <p:nvPr/>
+        </p:nvCxnSpPr>
+        <p:spPr>
+          <a:xfrm>
+            <a:off x="5049240" y="4543279"/>
+            <a:ext cx="0" cy="1714919"/>
+          </a:xfrm>
+          <a:prstGeom prst="line">
+            <a:avLst/>
+          </a:prstGeom>
+        </p:spPr>
+        <p:style>
+          <a:lnRef idx="1">
+            <a:schemeClr val="dk1"/>
+          </a:lnRef>
+          <a:fillRef idx="0">
+            <a:schemeClr val="dk1"/>
+          </a:fillRef>
+          <a:effectRef idx="0">
+            <a:schemeClr val="dk1"/>
+          </a:effectRef>
+          <a:fontRef idx="minor">
+            <a:schemeClr val="tx1"/>
+          </a:fontRef>
+        </p:style>
+      </p:cxnSp>
+      <p:cxnSp>
+        <p:nvCxnSpPr>
+          <p:cNvPr id="101" name="Straight Arrow Connector 100">
+            <a:extLst>
+              <a:ext uri="{FF2B5EF4-FFF2-40B4-BE49-F238E27FC236}">
+                <a16:creationId xmlns:a16="http://schemas.microsoft.com/office/drawing/2014/main" xmlns="" id="{93890486-74D2-45FF-A307-364928250438}"/>
+              </a:ext>
+            </a:extLst>
+          </p:cNvPr>
+          <p:cNvCxnSpPr>
+            <a:cxnSpLocks/>
+          </p:cNvCxnSpPr>
+          <p:nvPr/>
+        </p:nvCxnSpPr>
+        <p:spPr>
+          <a:xfrm flipH="1">
+            <a:off x="2571993" y="4543279"/>
+            <a:ext cx="1" cy="375642"/>
+          </a:xfrm>
+          <a:prstGeom prst="straightConnector1">
+            <a:avLst/>
+          </a:prstGeom>
+          <a:ln>
+            <a:tailEnd type="triangle"/>
+          </a:ln>
+        </p:spPr>
+        <p:style>
+          <a:lnRef idx="1">
+            <a:schemeClr val="dk1"/>
+          </a:lnRef>
+          <a:fillRef idx="0">
+            <a:schemeClr val="dk1"/>
+          </a:fillRef>
+          <a:effectRef idx="0">
+            <a:schemeClr val="dk1"/>
+          </a:effectRef>
+          <a:fontRef idx="minor">
+            <a:schemeClr val="tx1"/>
+          </a:fontRef>
+        </p:style>
+      </p:cxnSp>
+      <p:cxnSp>
+        <p:nvCxnSpPr>
+          <p:cNvPr id="106" name="Straight Connector 105">
+            <a:extLst>
+              <a:ext uri="{FF2B5EF4-FFF2-40B4-BE49-F238E27FC236}">
+                <a16:creationId xmlns:a16="http://schemas.microsoft.com/office/drawing/2014/main" xmlns="" id="{3AE9CE8A-80E1-4D09-9F84-E25B9A8DAF68}"/>
+              </a:ext>
+            </a:extLst>
+          </p:cNvPr>
+          <p:cNvCxnSpPr>
+            <a:cxnSpLocks/>
+          </p:cNvCxnSpPr>
+          <p:nvPr/>
+        </p:nvCxnSpPr>
+        <p:spPr>
+          <a:xfrm>
+            <a:off x="3725626" y="3297575"/>
+            <a:ext cx="403729" cy="0"/>
+          </a:xfrm>
+          <a:prstGeom prst="line">
+            <a:avLst/>
+          </a:prstGeom>
+        </p:spPr>
+        <p:style>
+          <a:lnRef idx="1">
+            <a:schemeClr val="dk1"/>
+          </a:lnRef>
+          <a:fillRef idx="0">
+            <a:schemeClr val="dk1"/>
+          </a:fillRef>
+          <a:effectRef idx="0">
+            <a:schemeClr val="dk1"/>
+          </a:effectRef>
+          <a:fontRef idx="minor">
+            <a:schemeClr val="tx1"/>
+          </a:fontRef>
+        </p:style>
+      </p:cxnSp>
+      <p:sp>
+        <p:nvSpPr>
+          <p:cNvPr id="108" name="TextBox 107">
+            <a:extLst>
+              <a:ext uri="{FF2B5EF4-FFF2-40B4-BE49-F238E27FC236}">
+                <a16:creationId xmlns:a16="http://schemas.microsoft.com/office/drawing/2014/main" xmlns="" id="{3ABD3846-DF71-49C4-AE22-6CE1C8B39149}"/>
+              </a:ext>
+            </a:extLst>
+          </p:cNvPr>
+          <p:cNvSpPr txBox="1"/>
+          <p:nvPr/>
+        </p:nvSpPr>
+        <p:spPr>
+          <a:xfrm>
+            <a:off x="3721628" y="2908366"/>
+            <a:ext cx="694431" cy="369460"/>
+          </a:xfrm>
+          <a:prstGeom prst="rect">
+            <a:avLst/>
+          </a:prstGeom>
+          <a:noFill/>
+        </p:spPr>
+        <p:txBody>
+          <a:bodyPr wrap="square" rtlCol="0">
+            <a:spAutoFit/>
+          </a:bodyPr>
+          <a:lstStyle/>
+          <a:p>
+            <a:r>
+              <a:rPr lang="en-SG" sz="1801" dirty="0" smtClean="0"/>
+              <a:t>[else</a:t>
+            </a:r>
+            <a:r>
+              <a:rPr lang="en-SG" sz="1801" dirty="0" smtClean="0"/>
+              <a:t>]</a:t>
+            </a:r>
+            <a:endParaRPr lang="en-SG" sz="1801" dirty="0"/>
+          </a:p>
+        </p:txBody>
+      </p:sp>
+      <p:cxnSp>
+        <p:nvCxnSpPr>
+          <p:cNvPr id="109" name="Straight Arrow Connector 108">
+            <a:extLst>
+              <a:ext uri="{FF2B5EF4-FFF2-40B4-BE49-F238E27FC236}">
+                <a16:creationId xmlns:a16="http://schemas.microsoft.com/office/drawing/2014/main" xmlns="" id="{46F847A3-19CB-4D8A-BF61-CBF1573B6170}"/>
+              </a:ext>
+            </a:extLst>
+          </p:cNvPr>
+          <p:cNvCxnSpPr>
+            <a:cxnSpLocks/>
+          </p:cNvCxnSpPr>
+          <p:nvPr/>
+        </p:nvCxnSpPr>
+        <p:spPr>
+          <a:xfrm>
+            <a:off x="4133803" y="3297575"/>
+            <a:ext cx="0" cy="484138"/>
+          </a:xfrm>
+          <a:prstGeom prst="straightConnector1">
+            <a:avLst/>
+          </a:prstGeom>
+          <a:ln>
+            <a:tailEnd type="triangle"/>
+          </a:ln>
+        </p:spPr>
+        <p:style>
+          <a:lnRef idx="1">
+            <a:schemeClr val="dk1"/>
+          </a:lnRef>
+          <a:fillRef idx="0">
+            <a:schemeClr val="dk1"/>
+          </a:fillRef>
+          <a:effectRef idx="0">
+            <a:schemeClr val="dk1"/>
+          </a:effectRef>
+          <a:fontRef idx="minor">
+            <a:schemeClr val="tx1"/>
+          </a:fontRef>
+        </p:style>
+      </p:cxnSp>
+      <p:sp>
+        <p:nvSpPr>
+          <p:cNvPr id="112" name="Diamond 111">
+            <a:extLst>
+              <a:ext uri="{FF2B5EF4-FFF2-40B4-BE49-F238E27FC236}">
+                <a16:creationId xmlns:a16="http://schemas.microsoft.com/office/drawing/2014/main" xmlns="" id="{0ACD7DC4-F31E-42B2-9D34-41B1AE997EB1}"/>
+              </a:ext>
+            </a:extLst>
+          </p:cNvPr>
+          <p:cNvSpPr/>
+          <p:nvPr/>
+        </p:nvSpPr>
+        <p:spPr>
+          <a:xfrm>
+            <a:off x="4103134" y="6913165"/>
+            <a:ext cx="480766" cy="480766"/>
+          </a:xfrm>
+          <a:prstGeom prst="diamond">
+            <a:avLst/>
+          </a:prstGeom>
+        </p:spPr>
+        <p:style>
+          <a:lnRef idx="1">
+            <a:schemeClr val="accent6"/>
+          </a:lnRef>
+          <a:fillRef idx="2">
+            <a:schemeClr val="accent6"/>
+          </a:fillRef>
+          <a:effectRef idx="1">
+            <a:schemeClr val="accent6"/>
+          </a:effectRef>
+          <a:fontRef idx="minor">
+            <a:schemeClr val="dk1"/>
+          </a:fontRef>
+        </p:style>
+        <p:txBody>
+          <a:bodyPr rot="0" spcFirstLastPara="0" vertOverflow="overflow" horzOverflow="overflow" vert="horz" wrap="square" lIns="91440" tIns="45721" rIns="91440" bIns="45721" numCol="1" spcCol="0" rtlCol="0" fromWordArt="0" anchor="ctr" anchorCtr="0" forceAA="0" compatLnSpc="1">
+            <a:prstTxWarp prst="textNoShape">
+              <a:avLst/>
+            </a:prstTxWarp>
+            <a:noAutofit/>
+          </a:bodyPr>
+          <a:lstStyle/>
+          <a:p>
+            <a:pPr algn="ctr"/>
+            <a:endParaRPr lang="en-SG" sz="1801"/>
+          </a:p>
+        </p:txBody>
+      </p:sp>
+      <p:cxnSp>
+        <p:nvCxnSpPr>
+          <p:cNvPr id="117" name="Straight Arrow Connector 116">
+            <a:extLst>
+              <a:ext uri="{FF2B5EF4-FFF2-40B4-BE49-F238E27FC236}">
+                <a16:creationId xmlns:a16="http://schemas.microsoft.com/office/drawing/2014/main" xmlns="" id="{CD1E2DBC-0139-4003-ADA5-A30804607F85}"/>
+              </a:ext>
+            </a:extLst>
+          </p:cNvPr>
+          <p:cNvCxnSpPr>
+            <a:cxnSpLocks/>
+          </p:cNvCxnSpPr>
+          <p:nvPr/>
+        </p:nvCxnSpPr>
+        <p:spPr>
+          <a:xfrm>
+            <a:off x="3481245" y="7153548"/>
+            <a:ext cx="612045" cy="0"/>
+          </a:xfrm>
+          <a:prstGeom prst="straightConnector1">
+            <a:avLst/>
+          </a:prstGeom>
+          <a:ln>
+            <a:tailEnd type="triangle"/>
+          </a:ln>
+        </p:spPr>
+        <p:style>
+          <a:lnRef idx="1">
+            <a:schemeClr val="dk1"/>
+          </a:lnRef>
+          <a:fillRef idx="0">
+            <a:schemeClr val="dk1"/>
+          </a:fillRef>
+          <a:effectRef idx="0">
+            <a:schemeClr val="dk1"/>
+          </a:effectRef>
+          <a:fontRef idx="minor">
+            <a:schemeClr val="tx1"/>
+          </a:fontRef>
+        </p:style>
+      </p:cxnSp>
+      <p:cxnSp>
+        <p:nvCxnSpPr>
+          <p:cNvPr id="119" name="Straight Arrow Connector 118">
+            <a:extLst>
+              <a:ext uri="{FF2B5EF4-FFF2-40B4-BE49-F238E27FC236}">
+                <a16:creationId xmlns:a16="http://schemas.microsoft.com/office/drawing/2014/main" xmlns="" id="{AE0F687C-662C-4955-B0CF-562209CBC177}"/>
+              </a:ext>
+            </a:extLst>
+          </p:cNvPr>
+          <p:cNvCxnSpPr>
+            <a:cxnSpLocks/>
+          </p:cNvCxnSpPr>
+          <p:nvPr/>
+        </p:nvCxnSpPr>
+        <p:spPr>
+          <a:xfrm flipH="1">
+            <a:off x="4583900" y="7153548"/>
+            <a:ext cx="1932946" cy="0"/>
+          </a:xfrm>
+          <a:prstGeom prst="straightConnector1">
+            <a:avLst/>
+          </a:prstGeom>
+          <a:ln>
+            <a:tailEnd type="triangle"/>
+          </a:ln>
+        </p:spPr>
+        <p:style>
+          <a:lnRef idx="1">
+            <a:schemeClr val="dk1"/>
+          </a:lnRef>
+          <a:fillRef idx="0">
+            <a:schemeClr val="dk1"/>
+          </a:fillRef>
+          <a:effectRef idx="0">
+            <a:schemeClr val="dk1"/>
+          </a:effectRef>
+          <a:fontRef idx="minor">
+            <a:schemeClr val="tx1"/>
+          </a:fontRef>
+        </p:style>
+      </p:cxnSp>
+      <p:cxnSp>
+        <p:nvCxnSpPr>
+          <p:cNvPr id="122" name="Straight Connector 121">
+            <a:extLst>
+              <a:ext uri="{FF2B5EF4-FFF2-40B4-BE49-F238E27FC236}">
+                <a16:creationId xmlns:a16="http://schemas.microsoft.com/office/drawing/2014/main" xmlns="" id="{1321E06C-BD3F-48BC-B492-E9A960F6A4C8}"/>
+              </a:ext>
+            </a:extLst>
+          </p:cNvPr>
+          <p:cNvCxnSpPr>
+            <a:cxnSpLocks/>
+          </p:cNvCxnSpPr>
+          <p:nvPr/>
+        </p:nvCxnSpPr>
+        <p:spPr>
+          <a:xfrm>
+            <a:off x="4352585" y="7393931"/>
+            <a:ext cx="0" cy="603440"/>
+          </a:xfrm>
+          <a:prstGeom prst="line">
+            <a:avLst/>
+          </a:prstGeom>
+        </p:spPr>
+        <p:style>
+          <a:lnRef idx="1">
+            <a:schemeClr val="dk1"/>
+          </a:lnRef>
+          <a:fillRef idx="0">
+            <a:schemeClr val="dk1"/>
+          </a:fillRef>
+          <a:effectRef idx="0">
+            <a:schemeClr val="dk1"/>
+          </a:effectRef>
+          <a:fontRef idx="minor">
+            <a:schemeClr val="tx1"/>
+          </a:fontRef>
+        </p:style>
+      </p:cxnSp>
+      <p:sp>
+        <p:nvSpPr>
+          <p:cNvPr id="123" name="Diamond 122">
+            <a:extLst>
+              <a:ext uri="{FF2B5EF4-FFF2-40B4-BE49-F238E27FC236}">
+                <a16:creationId xmlns:a16="http://schemas.microsoft.com/office/drawing/2014/main" xmlns="" id="{0ACD7DC4-F31E-42B2-9D34-41B1AE997EB1}"/>
+              </a:ext>
+            </a:extLst>
+          </p:cNvPr>
+          <p:cNvSpPr/>
+          <p:nvPr/>
+        </p:nvSpPr>
+        <p:spPr>
+          <a:xfrm>
+            <a:off x="5706947" y="7728585"/>
+            <a:ext cx="480766" cy="480766"/>
+          </a:xfrm>
+          <a:prstGeom prst="diamond">
+            <a:avLst/>
+          </a:prstGeom>
+        </p:spPr>
+        <p:style>
+          <a:lnRef idx="1">
+            <a:schemeClr val="accent6"/>
+          </a:lnRef>
+          <a:fillRef idx="2">
+            <a:schemeClr val="accent6"/>
+          </a:fillRef>
+          <a:effectRef idx="1">
+            <a:schemeClr val="accent6"/>
+          </a:effectRef>
+          <a:fontRef idx="minor">
+            <a:schemeClr val="dk1"/>
+          </a:fontRef>
+        </p:style>
+        <p:txBody>
+          <a:bodyPr rot="0" spcFirstLastPara="0" vertOverflow="overflow" horzOverflow="overflow" vert="horz" wrap="square" lIns="91440" tIns="45721" rIns="91440" bIns="45721" numCol="1" spcCol="0" rtlCol="0" fromWordArt="0" anchor="ctr" anchorCtr="0" forceAA="0" compatLnSpc="1">
+            <a:prstTxWarp prst="textNoShape">
+              <a:avLst/>
+            </a:prstTxWarp>
+            <a:noAutofit/>
+          </a:bodyPr>
+          <a:lstStyle/>
+          <a:p>
+            <a:pPr algn="ctr"/>
+            <a:endParaRPr lang="en-SG" sz="1801"/>
+          </a:p>
+        </p:txBody>
+      </p:sp>
+      <p:cxnSp>
+        <p:nvCxnSpPr>
+          <p:cNvPr id="124" name="Straight Arrow Connector 123"/>
+          <p:cNvCxnSpPr/>
+          <p:nvPr/>
+        </p:nvCxnSpPr>
+        <p:spPr>
+          <a:xfrm>
+            <a:off x="4352585" y="7997371"/>
+            <a:ext cx="1339676" cy="0"/>
+          </a:xfrm>
+          <a:prstGeom prst="straightConnector1">
+            <a:avLst/>
+          </a:prstGeom>
+          <a:ln>
+            <a:solidFill>
+              <a:schemeClr val="tx1"/>
+            </a:solidFill>
+            <a:tailEnd type="triangle"/>
+          </a:ln>
+        </p:spPr>
+        <p:style>
+          <a:lnRef idx="1">
+            <a:schemeClr val="accent1"/>
+          </a:lnRef>
+          <a:fillRef idx="0">
+            <a:schemeClr val="accent1"/>
+          </a:fillRef>
+          <a:effectRef idx="0">
+            <a:schemeClr val="accent1"/>
+          </a:effectRef>
+          <a:fontRef idx="minor">
+            <a:schemeClr val="tx1"/>
+          </a:fontRef>
+        </p:style>
+      </p:cxnSp>
+      <p:cxnSp>
+        <p:nvCxnSpPr>
+          <p:cNvPr id="126" name="Straight Connector 125">
+            <a:extLst>
+              <a:ext uri="{FF2B5EF4-FFF2-40B4-BE49-F238E27FC236}">
+                <a16:creationId xmlns:a16="http://schemas.microsoft.com/office/drawing/2014/main" xmlns="" id="{CB79C1E5-CFA9-408B-95DD-38477A84EB23}"/>
+              </a:ext>
+            </a:extLst>
+          </p:cNvPr>
+          <p:cNvCxnSpPr>
+            <a:cxnSpLocks/>
+          </p:cNvCxnSpPr>
+          <p:nvPr/>
+        </p:nvCxnSpPr>
+        <p:spPr>
+          <a:xfrm>
+            <a:off x="8083514" y="3093096"/>
+            <a:ext cx="0" cy="4904275"/>
+          </a:xfrm>
+          <a:prstGeom prst="line">
+            <a:avLst/>
+          </a:prstGeom>
+        </p:spPr>
+        <p:style>
+          <a:lnRef idx="1">
+            <a:schemeClr val="dk1"/>
+          </a:lnRef>
+          <a:fillRef idx="0">
+            <a:schemeClr val="dk1"/>
+          </a:fillRef>
+          <a:effectRef idx="0">
+            <a:schemeClr val="dk1"/>
+          </a:effectRef>
+          <a:fontRef idx="minor">
+            <a:schemeClr val="tx1"/>
+          </a:fontRef>
+        </p:style>
+      </p:cxnSp>
+      <p:cxnSp>
+        <p:nvCxnSpPr>
+          <p:cNvPr id="128" name="Straight Arrow Connector 127">
+            <a:extLst>
+              <a:ext uri="{FF2B5EF4-FFF2-40B4-BE49-F238E27FC236}">
+                <a16:creationId xmlns:a16="http://schemas.microsoft.com/office/drawing/2014/main" xmlns="" id="{AE0F687C-662C-4955-B0CF-562209CBC177}"/>
+              </a:ext>
+            </a:extLst>
+          </p:cNvPr>
+          <p:cNvCxnSpPr>
+            <a:cxnSpLocks/>
+          </p:cNvCxnSpPr>
+          <p:nvPr/>
+        </p:nvCxnSpPr>
+        <p:spPr>
+          <a:xfrm flipH="1">
+            <a:off x="6180848" y="7987912"/>
+            <a:ext cx="1902666" cy="0"/>
+          </a:xfrm>
+          <a:prstGeom prst="straightConnector1">
+            <a:avLst/>
+          </a:prstGeom>
+          <a:ln>
+            <a:tailEnd type="triangle"/>
+          </a:ln>
+        </p:spPr>
+        <p:style>
+          <a:lnRef idx="1">
+            <a:schemeClr val="dk1"/>
+          </a:lnRef>
+          <a:fillRef idx="0">
+            <a:schemeClr val="dk1"/>
+          </a:fillRef>
+          <a:effectRef idx="0">
+            <a:schemeClr val="dk1"/>
+          </a:effectRef>
+          <a:fontRef idx="minor">
+            <a:schemeClr val="tx1"/>
+          </a:fontRef>
+        </p:style>
+      </p:cxnSp>
+      <p:cxnSp>
+        <p:nvCxnSpPr>
+          <p:cNvPr id="130" name="Straight Connector 129">
+            <a:extLst>
+              <a:ext uri="{FF2B5EF4-FFF2-40B4-BE49-F238E27FC236}">
+                <a16:creationId xmlns:a16="http://schemas.microsoft.com/office/drawing/2014/main" xmlns="" id="{CB79C1E5-CFA9-408B-95DD-38477A84EB23}"/>
+              </a:ext>
+            </a:extLst>
+          </p:cNvPr>
+          <p:cNvCxnSpPr>
+            <a:cxnSpLocks/>
+          </p:cNvCxnSpPr>
+          <p:nvPr/>
+        </p:nvCxnSpPr>
+        <p:spPr>
+          <a:xfrm>
+            <a:off x="5947330" y="8223865"/>
+            <a:ext cx="0" cy="742813"/>
+          </a:xfrm>
+          <a:prstGeom prst="line">
+            <a:avLst/>
+          </a:prstGeom>
+        </p:spPr>
+        <p:style>
+          <a:lnRef idx="1">
+            <a:schemeClr val="dk1"/>
+          </a:lnRef>
+          <a:fillRef idx="0">
+            <a:schemeClr val="dk1"/>
+          </a:fillRef>
+          <a:effectRef idx="0">
+            <a:schemeClr val="dk1"/>
           </a:effectRef>
           <a:fontRef idx="minor">
             <a:schemeClr val="tx1"/>

</xml_diff>